<commit_message>
feat: updated multiple files
</commit_message>
<xml_diff>
--- a/Build My Life - Housefires.pptx
+++ b/Build My Life - Housefires.pptx
@@ -10,6 +10,7 @@
     <p:sldId id="259" r:id="rId4"/>
     <p:sldId id="260" r:id="rId5"/>
     <p:sldId id="261" r:id="rId6"/>
+    <p:sldId id="262" r:id="rId7"/>
   </p:sldIdLst>
   <p:sldSz cx="9144000" cy="6858000" type="screen4x3"/>
   <p:notesSz cx="6858000" cy="9144000"/>
@@ -4115,6 +4116,74 @@
         </p:txBody>
       </p:sp>
     </p:spTree>
+  </p:cSld>
+  <p:clrMapOvr>
+    <a:masterClrMapping/>
+  </p:clrMapOvr>
+</p:sld>
+</file>
+
+<file path=ppt/slides/slide6.xml><?xml version="1.0" encoding="utf-8"?>
+<p:sld xmlns:a="http://schemas.openxmlformats.org/drawingml/2006/main" xmlns:r="http://schemas.openxmlformats.org/officeDocument/2006/relationships" xmlns:p="http://schemas.openxmlformats.org/presentationml/2006/main">
+  <p:cSld>
+    <p:spTree>
+      <p:nvGrpSpPr>
+        <p:cNvPr id="1" name=""/>
+        <p:cNvGrpSpPr/>
+        <p:nvPr/>
+      </p:nvGrpSpPr>
+      <p:grpSpPr>
+        <a:xfrm>
+          <a:off x="0" y="0"/>
+          <a:ext cx="0" cy="0"/>
+          <a:chOff x="0" y="0"/>
+          <a:chExt cx="0" cy="0"/>
+        </a:xfrm>
+      </p:grpSpPr>
+      <p:sp>
+        <p:nvSpPr>
+          <p:cNvPr id="6146" name="Rectangle 2"/>
+          <p:cNvSpPr>
+            <a:spLocks noGrp="1" noChangeArrowheads="1"/>
+          </p:cNvSpPr>
+          <p:nvPr>
+            <p:ph type="subTitle" idx="1"/>
+          </p:nvPr>
+        </p:nvSpPr>
+        <p:spPr>
+          <a:xfrm>
+            <a:off x="85725" y="0"/>
+            <a:ext cx="9058275" cy="2590800"/>
+          </a:xfrm>
+        </p:spPr>
+        <p:txBody>
+          <a:bodyPr/>
+          <a:lstStyle/>
+          <a:p>
+            <a:pPr algn="l" eaLnBrk="1" hangingPunct="1">
+              <a:lnSpc>
+                <a:spcPct val="80000"/>
+              </a:lnSpc>
+              <a:spcBef>
+                <a:spcPct val="0"/>
+              </a:spcBef>
+            </a:pPr>
+            <a:endParaRPr lang="en-US" b="1" dirty="0">
+              <a:solidFill>
+                <a:schemeClr val="bg1"/>
+              </a:solidFill>
+              <a:latin typeface="Arial" charset="0"/>
+              <a:cs typeface="Times New Roman" charset="0"/>
+            </a:endParaRPr>
+          </a:p>
+        </p:txBody>
+      </p:sp>
+    </p:spTree>
+    <p:extLst>
+      <p:ext uri="{BB962C8B-B14F-4D97-AF65-F5344CB8AC3E}">
+        <p14:creationId xmlns:p14="http://schemas.microsoft.com/office/powerpoint/2010/main" val="3189776147"/>
+      </p:ext>
+    </p:extLst>
   </p:cSld>
   <p:clrMapOvr>
     <a:masterClrMapping/>

</xml_diff>